<commit_message>
added in the end of first term
</commit_message>
<xml_diff>
--- a/theory/лекция 4-5. пузырёк.pptx
+++ b/theory/лекция 4-5. пузырёк.pptx
@@ -213,7 +213,7 @@
           <a:p>
             <a:fld id="{592C5407-584F-4DB8-B853-0BA28DFA17F9}" type="datetimeFigureOut">
               <a:rPr lang="ru-RU" smtClean="0"/>
-              <a:t>12.10.2021</a:t>
+              <a:t>25.01.2022</a:t>
             </a:fld>
             <a:endParaRPr lang="ru-RU"/>
           </a:p>
@@ -1197,7 +1197,7 @@
           <a:p>
             <a:fld id="{E6BB5854-775E-4BC6-86FB-136BE070D9A5}" type="datetimeFigureOut">
               <a:rPr lang="ru-RU" smtClean="0"/>
-              <a:t>12.10.2021</a:t>
+              <a:t>25.01.2022</a:t>
             </a:fld>
             <a:endParaRPr lang="ru-RU"/>
           </a:p>
@@ -1365,7 +1365,7 @@
           <a:p>
             <a:fld id="{E6BB5854-775E-4BC6-86FB-136BE070D9A5}" type="datetimeFigureOut">
               <a:rPr lang="ru-RU" smtClean="0"/>
-              <a:t>12.10.2021</a:t>
+              <a:t>25.01.2022</a:t>
             </a:fld>
             <a:endParaRPr lang="ru-RU"/>
           </a:p>
@@ -1543,7 +1543,7 @@
           <a:p>
             <a:fld id="{E6BB5854-775E-4BC6-86FB-136BE070D9A5}" type="datetimeFigureOut">
               <a:rPr lang="ru-RU" smtClean="0"/>
-              <a:t>12.10.2021</a:t>
+              <a:t>25.01.2022</a:t>
             </a:fld>
             <a:endParaRPr lang="ru-RU"/>
           </a:p>
@@ -1711,7 +1711,7 @@
           <a:p>
             <a:fld id="{E6BB5854-775E-4BC6-86FB-136BE070D9A5}" type="datetimeFigureOut">
               <a:rPr lang="ru-RU" smtClean="0"/>
-              <a:t>12.10.2021</a:t>
+              <a:t>25.01.2022</a:t>
             </a:fld>
             <a:endParaRPr lang="ru-RU"/>
           </a:p>
@@ -1956,7 +1956,7 @@
           <a:p>
             <a:fld id="{E6BB5854-775E-4BC6-86FB-136BE070D9A5}" type="datetimeFigureOut">
               <a:rPr lang="ru-RU" smtClean="0"/>
-              <a:t>12.10.2021</a:t>
+              <a:t>25.01.2022</a:t>
             </a:fld>
             <a:endParaRPr lang="ru-RU"/>
           </a:p>
@@ -2185,7 +2185,7 @@
           <a:p>
             <a:fld id="{E6BB5854-775E-4BC6-86FB-136BE070D9A5}" type="datetimeFigureOut">
               <a:rPr lang="ru-RU" smtClean="0"/>
-              <a:t>12.10.2021</a:t>
+              <a:t>25.01.2022</a:t>
             </a:fld>
             <a:endParaRPr lang="ru-RU"/>
           </a:p>
@@ -2549,7 +2549,7 @@
           <a:p>
             <a:fld id="{E6BB5854-775E-4BC6-86FB-136BE070D9A5}" type="datetimeFigureOut">
               <a:rPr lang="ru-RU" smtClean="0"/>
-              <a:t>12.10.2021</a:t>
+              <a:t>25.01.2022</a:t>
             </a:fld>
             <a:endParaRPr lang="ru-RU"/>
           </a:p>
@@ -2666,7 +2666,7 @@
           <a:p>
             <a:fld id="{E6BB5854-775E-4BC6-86FB-136BE070D9A5}" type="datetimeFigureOut">
               <a:rPr lang="ru-RU" smtClean="0"/>
-              <a:t>12.10.2021</a:t>
+              <a:t>25.01.2022</a:t>
             </a:fld>
             <a:endParaRPr lang="ru-RU"/>
           </a:p>
@@ -2761,7 +2761,7 @@
           <a:p>
             <a:fld id="{E6BB5854-775E-4BC6-86FB-136BE070D9A5}" type="datetimeFigureOut">
               <a:rPr lang="ru-RU" smtClean="0"/>
-              <a:t>12.10.2021</a:t>
+              <a:t>25.01.2022</a:t>
             </a:fld>
             <a:endParaRPr lang="ru-RU"/>
           </a:p>
@@ -3036,7 +3036,7 @@
           <a:p>
             <a:fld id="{E6BB5854-775E-4BC6-86FB-136BE070D9A5}" type="datetimeFigureOut">
               <a:rPr lang="ru-RU" smtClean="0"/>
-              <a:t>12.10.2021</a:t>
+              <a:t>25.01.2022</a:t>
             </a:fld>
             <a:endParaRPr lang="ru-RU"/>
           </a:p>
@@ -3288,7 +3288,7 @@
           <a:p>
             <a:fld id="{E6BB5854-775E-4BC6-86FB-136BE070D9A5}" type="datetimeFigureOut">
               <a:rPr lang="ru-RU" smtClean="0"/>
-              <a:t>12.10.2021</a:t>
+              <a:t>25.01.2022</a:t>
             </a:fld>
             <a:endParaRPr lang="ru-RU"/>
           </a:p>
@@ -3505,7 +3505,7 @@
           <a:p>
             <a:fld id="{E6BB5854-775E-4BC6-86FB-136BE070D9A5}" type="datetimeFigureOut">
               <a:rPr lang="ru-RU" smtClean="0"/>
-              <a:t>12.10.2021</a:t>
+              <a:t>25.01.2022</a:t>
             </a:fld>
             <a:endParaRPr lang="ru-RU"/>
           </a:p>
@@ -14847,40 +14847,13 @@
             <a:lstStyle/>
             <a:p>
               <a:r>
-                <a:rPr lang="ru-RU" dirty="0" err="1">
+                <a:rPr lang="ru-RU" dirty="0">
                   <a:solidFill>
                     <a:srgbClr val="F2F2F2"/>
                   </a:solidFill>
                   <a:latin typeface="Georgia" panose="02040502050405020303" pitchFamily="18" charset="0"/>
                 </a:rPr>
-                <a:t>Параме</a:t>
-              </a:r>
-              <a:r>
-                <a:rPr lang="ru-RU" dirty="0">
-                  <a:solidFill>
-                    <a:srgbClr val="F2F2F2"/>
-                  </a:solidFill>
-                  <a:latin typeface="Georgia" panose="02040502050405020303" pitchFamily="18" charset="0"/>
-                </a:rPr>
-                <a:t>	</a:t>
-              </a:r>
-              <a:r>
-                <a:rPr lang="ru-RU" dirty="0" err="1">
-                  <a:solidFill>
-                    <a:srgbClr val="F2F2F2"/>
-                  </a:solidFill>
-                  <a:latin typeface="Georgia" panose="02040502050405020303" pitchFamily="18" charset="0"/>
-                </a:rPr>
-                <a:t>тр</a:t>
-              </a:r>
-              <a:r>
-                <a:rPr lang="ru-RU" dirty="0">
-                  <a:solidFill>
-                    <a:srgbClr val="F2F2F2"/>
-                  </a:solidFill>
-                  <a:latin typeface="Georgia" panose="02040502050405020303" pitchFamily="18" charset="0"/>
-                </a:rPr>
-                <a:t> внешнего цикла </a:t>
+                <a:t>Параметр внешнего цикла </a:t>
               </a:r>
               <a:r>
                 <a:rPr lang="en-US" dirty="0" err="1">

</xml_diff>